<commit_message>
quiz one uploaded and modified
</commit_message>
<xml_diff>
--- a/nodequiz/src/assets/presentations/RESTful APIs.pptx
+++ b/nodequiz/src/assets/presentations/RESTful APIs.pptx
@@ -115,6 +115,11 @@
       </a:defRPr>
     </a:lvl9pPr>
   </p:defaultTextStyle>
+  <p:extLst>
+    <p:ext uri="{EFAFB233-063F-42B5-8137-9DF3F51BA10A}">
+      <p15:sldGuideLst xmlns:p15="http://schemas.microsoft.com/office/powerpoint/2012/main"/>
+    </p:ext>
+  </p:extLst>
 </p:presentation>
 </file>
 
@@ -160,7 +165,7 @@
           </a:lstStyle>
           <a:p>
             <a:r>
-              <a:rPr lang="en-US" smtClean="0"/>
+              <a:rPr lang="en-US"/>
               <a:t>Click to edit Master title style</a:t>
             </a:r>
             <a:endParaRPr lang="en-US" dirty="0"/>
@@ -280,7 +285,7 @@
           </a:lstStyle>
           <a:p>
             <a:r>
-              <a:rPr lang="en-US" smtClean="0"/>
+              <a:rPr lang="en-US"/>
               <a:t>Click to edit Master subtitle style</a:t>
             </a:r>
             <a:endParaRPr lang="en-US" dirty="0"/>
@@ -304,7 +309,7 @@
           <a:p>
             <a:fld id="{B6CD1D1C-A60F-49DB-B039-0E3E8AB8179F}" type="datetimeFigureOut">
               <a:rPr lang="en-US" smtClean="0"/>
-              <a:t>9/25/2019</a:t>
+              <a:t>10/20/2019</a:t>
             </a:fld>
             <a:endParaRPr lang="en-US"/>
           </a:p>
@@ -409,7 +414,7 @@
           </a:lstStyle>
           <a:p>
             <a:r>
-              <a:rPr lang="en-US" smtClean="0"/>
+              <a:rPr lang="en-US"/>
               <a:t>Click to edit Master title style</a:t>
             </a:r>
             <a:endParaRPr lang="en-US" dirty="0"/>
@@ -488,7 +493,7 @@
           </a:lstStyle>
           <a:p>
             <a:r>
-              <a:rPr lang="en-US" smtClean="0"/>
+              <a:rPr lang="en-US"/>
               <a:t>Click icon to add picture</a:t>
             </a:r>
             <a:endParaRPr lang="en-US" dirty="0"/>
@@ -556,7 +561,7 @@
           <a:p>
             <a:pPr lvl="0"/>
             <a:r>
-              <a:rPr lang="en-US" smtClean="0"/>
+              <a:rPr lang="en-US"/>
               <a:t>Edit Master text styles</a:t>
             </a:r>
           </a:p>
@@ -579,7 +584,7 @@
           <a:p>
             <a:fld id="{B6CD1D1C-A60F-49DB-B039-0E3E8AB8179F}" type="datetimeFigureOut">
               <a:rPr lang="en-US" smtClean="0"/>
-              <a:t>9/25/2019</a:t>
+              <a:t>10/20/2019</a:t>
             </a:fld>
             <a:endParaRPr lang="en-US"/>
           </a:p>
@@ -682,7 +687,7 @@
           </a:lstStyle>
           <a:p>
             <a:r>
-              <a:rPr lang="en-US" smtClean="0"/>
+              <a:rPr lang="en-US"/>
               <a:t>Click to edit Master title style</a:t>
             </a:r>
             <a:endParaRPr lang="en-US" dirty="0"/>
@@ -750,7 +755,7 @@
           <a:p>
             <a:pPr lvl="0"/>
             <a:r>
-              <a:rPr lang="en-US" smtClean="0"/>
+              <a:rPr lang="en-US"/>
               <a:t>Edit Master text styles</a:t>
             </a:r>
           </a:p>
@@ -773,7 +778,7 @@
           <a:p>
             <a:fld id="{B6CD1D1C-A60F-49DB-B039-0E3E8AB8179F}" type="datetimeFigureOut">
               <a:rPr lang="en-US" smtClean="0"/>
-              <a:t>9/25/2019</a:t>
+              <a:t>10/20/2019</a:t>
             </a:fld>
             <a:endParaRPr lang="en-US"/>
           </a:p>
@@ -876,7 +881,7 @@
           </a:lstStyle>
           <a:p>
             <a:r>
-              <a:rPr lang="en-US" smtClean="0"/>
+              <a:rPr lang="en-US"/>
               <a:t>Click to edit Master title style</a:t>
             </a:r>
             <a:endParaRPr lang="en-US" dirty="0"/>
@@ -954,7 +959,7 @@
           <a:p>
             <a:pPr lvl="0"/>
             <a:r>
-              <a:rPr lang="en-US" smtClean="0"/>
+              <a:rPr lang="en-US"/>
               <a:t>Edit Master text styles</a:t>
             </a:r>
           </a:p>
@@ -1021,7 +1026,7 @@
           <a:p>
             <a:pPr lvl="0"/>
             <a:r>
-              <a:rPr lang="en-US" smtClean="0"/>
+              <a:rPr lang="en-US"/>
               <a:t>Edit Master text styles</a:t>
             </a:r>
           </a:p>
@@ -1044,7 +1049,7 @@
           <a:p>
             <a:fld id="{B6CD1D1C-A60F-49DB-B039-0E3E8AB8179F}" type="datetimeFigureOut">
               <a:rPr lang="en-US" smtClean="0"/>
-              <a:t>9/25/2019</a:t>
+              <a:t>10/20/2019</a:t>
             </a:fld>
             <a:endParaRPr lang="en-US"/>
           </a:p>
@@ -1227,7 +1232,7 @@
           </a:lstStyle>
           <a:p>
             <a:r>
-              <a:rPr lang="en-US" smtClean="0"/>
+              <a:rPr lang="en-US"/>
               <a:t>Click to edit Master title style</a:t>
             </a:r>
             <a:endParaRPr lang="en-US" dirty="0"/>
@@ -1348,7 +1353,7 @@
           <a:p>
             <a:pPr lvl="0"/>
             <a:r>
-              <a:rPr lang="en-US" smtClean="0"/>
+              <a:rPr lang="en-US"/>
               <a:t>Edit Master text styles</a:t>
             </a:r>
           </a:p>
@@ -1371,7 +1376,7 @@
           <a:p>
             <a:fld id="{B6CD1D1C-A60F-49DB-B039-0E3E8AB8179F}" type="datetimeFigureOut">
               <a:rPr lang="en-US" smtClean="0"/>
-              <a:t>9/25/2019</a:t>
+              <a:t>10/20/2019</a:t>
             </a:fld>
             <a:endParaRPr lang="en-US"/>
           </a:p>
@@ -1469,7 +1474,7 @@
           </a:lstStyle>
           <a:p>
             <a:r>
-              <a:rPr lang="en-US" smtClean="0"/>
+              <a:rPr lang="en-US"/>
               <a:t>Click to edit Master title style</a:t>
             </a:r>
             <a:endParaRPr lang="en-US" dirty="0"/>
@@ -1544,7 +1549,7 @@
           <a:p>
             <a:pPr lvl="0"/>
             <a:r>
-              <a:rPr lang="en-US" smtClean="0"/>
+              <a:rPr lang="en-US"/>
               <a:t>Edit Master text styles</a:t>
             </a:r>
           </a:p>
@@ -1611,7 +1616,7 @@
           <a:p>
             <a:pPr lvl="0"/>
             <a:r>
-              <a:rPr lang="en-US" smtClean="0"/>
+              <a:rPr lang="en-US"/>
               <a:t>Edit Master text styles</a:t>
             </a:r>
           </a:p>
@@ -1685,7 +1690,7 @@
           <a:p>
             <a:pPr lvl="0"/>
             <a:r>
-              <a:rPr lang="en-US" smtClean="0"/>
+              <a:rPr lang="en-US"/>
               <a:t>Edit Master text styles</a:t>
             </a:r>
           </a:p>
@@ -1752,7 +1757,7 @@
           <a:p>
             <a:pPr lvl="0"/>
             <a:r>
-              <a:rPr lang="en-US" smtClean="0"/>
+              <a:rPr lang="en-US"/>
               <a:t>Edit Master text styles</a:t>
             </a:r>
           </a:p>
@@ -1826,7 +1831,7 @@
           <a:p>
             <a:pPr lvl="0"/>
             <a:r>
-              <a:rPr lang="en-US" smtClean="0"/>
+              <a:rPr lang="en-US"/>
               <a:t>Edit Master text styles</a:t>
             </a:r>
           </a:p>
@@ -1893,7 +1898,7 @@
           <a:p>
             <a:pPr lvl="0"/>
             <a:r>
-              <a:rPr lang="en-US" smtClean="0"/>
+              <a:rPr lang="en-US"/>
               <a:t>Edit Master text styles</a:t>
             </a:r>
           </a:p>
@@ -1990,7 +1995,7 @@
           <a:p>
             <a:fld id="{B6CD1D1C-A60F-49DB-B039-0E3E8AB8179F}" type="datetimeFigureOut">
               <a:rPr lang="en-US" smtClean="0"/>
-              <a:t>9/25/2019</a:t>
+              <a:t>10/20/2019</a:t>
             </a:fld>
             <a:endParaRPr lang="en-US"/>
           </a:p>
@@ -2088,7 +2093,7 @@
           </a:lstStyle>
           <a:p>
             <a:r>
-              <a:rPr lang="en-US" smtClean="0"/>
+              <a:rPr lang="en-US"/>
               <a:t>Click to edit Master title style</a:t>
             </a:r>
             <a:endParaRPr lang="en-US" dirty="0"/>
@@ -2160,7 +2165,7 @@
           <a:p>
             <a:pPr lvl="0"/>
             <a:r>
-              <a:rPr lang="en-US" smtClean="0"/>
+              <a:rPr lang="en-US"/>
               <a:t>Edit Master text styles</a:t>
             </a:r>
           </a:p>
@@ -2238,7 +2243,7 @@
           </a:lstStyle>
           <a:p>
             <a:r>
-              <a:rPr lang="en-US" smtClean="0"/>
+              <a:rPr lang="en-US"/>
               <a:t>Click icon to add picture</a:t>
             </a:r>
             <a:endParaRPr lang="en-US" dirty="0"/>
@@ -2306,7 +2311,7 @@
           <a:p>
             <a:pPr lvl="0"/>
             <a:r>
-              <a:rPr lang="en-US" smtClean="0"/>
+              <a:rPr lang="en-US"/>
               <a:t>Edit Master text styles</a:t>
             </a:r>
           </a:p>
@@ -2377,7 +2382,7 @@
           <a:p>
             <a:pPr lvl="0"/>
             <a:r>
-              <a:rPr lang="en-US" smtClean="0"/>
+              <a:rPr lang="en-US"/>
               <a:t>Edit Master text styles</a:t>
             </a:r>
           </a:p>
@@ -2455,7 +2460,7 @@
           </a:lstStyle>
           <a:p>
             <a:r>
-              <a:rPr lang="en-US" smtClean="0"/>
+              <a:rPr lang="en-US"/>
               <a:t>Click icon to add picture</a:t>
             </a:r>
             <a:endParaRPr lang="en-US" dirty="0"/>
@@ -2523,7 +2528,7 @@
           <a:p>
             <a:pPr lvl="0"/>
             <a:r>
-              <a:rPr lang="en-US" smtClean="0"/>
+              <a:rPr lang="en-US"/>
               <a:t>Edit Master text styles</a:t>
             </a:r>
           </a:p>
@@ -2594,7 +2599,7 @@
           <a:p>
             <a:pPr lvl="0"/>
             <a:r>
-              <a:rPr lang="en-US" smtClean="0"/>
+              <a:rPr lang="en-US"/>
               <a:t>Edit Master text styles</a:t>
             </a:r>
           </a:p>
@@ -2672,7 +2677,7 @@
           </a:lstStyle>
           <a:p>
             <a:r>
-              <a:rPr lang="en-US" smtClean="0"/>
+              <a:rPr lang="en-US"/>
               <a:t>Click icon to add picture</a:t>
             </a:r>
             <a:endParaRPr lang="en-US" dirty="0"/>
@@ -2740,7 +2745,7 @@
           <a:p>
             <a:pPr lvl="0"/>
             <a:r>
-              <a:rPr lang="en-US" smtClean="0"/>
+              <a:rPr lang="en-US"/>
               <a:t>Edit Master text styles</a:t>
             </a:r>
           </a:p>
@@ -2837,7 +2842,7 @@
           <a:p>
             <a:fld id="{B6CD1D1C-A60F-49DB-B039-0E3E8AB8179F}" type="datetimeFigureOut">
               <a:rPr lang="en-US" smtClean="0"/>
-              <a:t>9/25/2019</a:t>
+              <a:t>10/20/2019</a:t>
             </a:fld>
             <a:endParaRPr lang="en-US"/>
           </a:p>
@@ -2931,7 +2936,7 @@
           <a:lstStyle/>
           <a:p>
             <a:r>
-              <a:rPr lang="en-US" smtClean="0"/>
+              <a:rPr lang="en-US"/>
               <a:t>Click to edit Master title style</a:t>
             </a:r>
             <a:endParaRPr lang="en-US" dirty="0"/>
@@ -2955,35 +2960,35 @@
           <a:p>
             <a:pPr lvl="0"/>
             <a:r>
-              <a:rPr lang="en-US" smtClean="0"/>
+              <a:rPr lang="en-US"/>
               <a:t>Edit Master text styles</a:t>
             </a:r>
           </a:p>
           <a:p>
             <a:pPr lvl="1"/>
             <a:r>
-              <a:rPr lang="en-US" smtClean="0"/>
+              <a:rPr lang="en-US"/>
               <a:t>Second level</a:t>
             </a:r>
           </a:p>
           <a:p>
             <a:pPr lvl="2"/>
             <a:r>
-              <a:rPr lang="en-US" smtClean="0"/>
+              <a:rPr lang="en-US"/>
               <a:t>Third level</a:t>
             </a:r>
           </a:p>
           <a:p>
             <a:pPr lvl="3"/>
             <a:r>
-              <a:rPr lang="en-US" smtClean="0"/>
+              <a:rPr lang="en-US"/>
               <a:t>Fourth level</a:t>
             </a:r>
           </a:p>
           <a:p>
             <a:pPr lvl="4"/>
             <a:r>
-              <a:rPr lang="en-US" smtClean="0"/>
+              <a:rPr lang="en-US"/>
               <a:t>Fifth level</a:t>
             </a:r>
             <a:endParaRPr lang="en-US" dirty="0"/>
@@ -3007,7 +3012,7 @@
           <a:p>
             <a:fld id="{B6CD1D1C-A60F-49DB-B039-0E3E8AB8179F}" type="datetimeFigureOut">
               <a:rPr lang="en-US" smtClean="0"/>
-              <a:t>9/25/2019</a:t>
+              <a:t>10/20/2019</a:t>
             </a:fld>
             <a:endParaRPr lang="en-US"/>
           </a:p>
@@ -3106,7 +3111,7 @@
           <a:lstStyle/>
           <a:p>
             <a:r>
-              <a:rPr lang="en-US" smtClean="0"/>
+              <a:rPr lang="en-US"/>
               <a:t>Click to edit Master title style</a:t>
             </a:r>
             <a:endParaRPr lang="en-US" dirty="0"/>
@@ -3135,35 +3140,35 @@
           <a:p>
             <a:pPr lvl="0"/>
             <a:r>
-              <a:rPr lang="en-US" smtClean="0"/>
+              <a:rPr lang="en-US"/>
               <a:t>Edit Master text styles</a:t>
             </a:r>
           </a:p>
           <a:p>
             <a:pPr lvl="1"/>
             <a:r>
-              <a:rPr lang="en-US" smtClean="0"/>
+              <a:rPr lang="en-US"/>
               <a:t>Second level</a:t>
             </a:r>
           </a:p>
           <a:p>
             <a:pPr lvl="2"/>
             <a:r>
-              <a:rPr lang="en-US" smtClean="0"/>
+              <a:rPr lang="en-US"/>
               <a:t>Third level</a:t>
             </a:r>
           </a:p>
           <a:p>
             <a:pPr lvl="3"/>
             <a:r>
-              <a:rPr lang="en-US" smtClean="0"/>
+              <a:rPr lang="en-US"/>
               <a:t>Fourth level</a:t>
             </a:r>
           </a:p>
           <a:p>
             <a:pPr lvl="4"/>
             <a:r>
-              <a:rPr lang="en-US" smtClean="0"/>
+              <a:rPr lang="en-US"/>
               <a:t>Fifth level</a:t>
             </a:r>
             <a:endParaRPr lang="en-US" dirty="0"/>
@@ -3187,7 +3192,7 @@
           <a:p>
             <a:fld id="{B6CD1D1C-A60F-49DB-B039-0E3E8AB8179F}" type="datetimeFigureOut">
               <a:rPr lang="en-US" smtClean="0"/>
-              <a:t>9/25/2019</a:t>
+              <a:t>10/20/2019</a:t>
             </a:fld>
             <a:endParaRPr lang="en-US"/>
           </a:p>
@@ -3281,7 +3286,7 @@
           <a:lstStyle/>
           <a:p>
             <a:r>
-              <a:rPr lang="en-US" smtClean="0"/>
+              <a:rPr lang="en-US"/>
               <a:t>Click to edit Master title style</a:t>
             </a:r>
             <a:endParaRPr lang="en-US" dirty="0"/>
@@ -3305,35 +3310,35 @@
           <a:p>
             <a:pPr lvl="0"/>
             <a:r>
-              <a:rPr lang="en-US" smtClean="0"/>
+              <a:rPr lang="en-US"/>
               <a:t>Edit Master text styles</a:t>
             </a:r>
           </a:p>
           <a:p>
             <a:pPr lvl="1"/>
             <a:r>
-              <a:rPr lang="en-US" smtClean="0"/>
+              <a:rPr lang="en-US"/>
               <a:t>Second level</a:t>
             </a:r>
           </a:p>
           <a:p>
             <a:pPr lvl="2"/>
             <a:r>
-              <a:rPr lang="en-US" smtClean="0"/>
+              <a:rPr lang="en-US"/>
               <a:t>Third level</a:t>
             </a:r>
           </a:p>
           <a:p>
             <a:pPr lvl="3"/>
             <a:r>
-              <a:rPr lang="en-US" smtClean="0"/>
+              <a:rPr lang="en-US"/>
               <a:t>Fourth level</a:t>
             </a:r>
           </a:p>
           <a:p>
             <a:pPr lvl="4"/>
             <a:r>
-              <a:rPr lang="en-US" smtClean="0"/>
+              <a:rPr lang="en-US"/>
               <a:t>Fifth level</a:t>
             </a:r>
             <a:endParaRPr lang="en-US" dirty="0"/>
@@ -3357,7 +3362,7 @@
           <a:p>
             <a:fld id="{B6CD1D1C-A60F-49DB-B039-0E3E8AB8179F}" type="datetimeFigureOut">
               <a:rPr lang="en-US" smtClean="0"/>
-              <a:t>9/25/2019</a:t>
+              <a:t>10/20/2019</a:t>
             </a:fld>
             <a:endParaRPr lang="en-US"/>
           </a:p>
@@ -3460,7 +3465,7 @@
           </a:lstStyle>
           <a:p>
             <a:r>
-              <a:rPr lang="en-US" smtClean="0"/>
+              <a:rPr lang="en-US"/>
               <a:t>Click to edit Master title style</a:t>
             </a:r>
             <a:endParaRPr lang="en-US" dirty="0"/>
@@ -3581,7 +3586,7 @@
           <a:p>
             <a:pPr lvl="0"/>
             <a:r>
-              <a:rPr lang="en-US" smtClean="0"/>
+              <a:rPr lang="en-US"/>
               <a:t>Edit Master text styles</a:t>
             </a:r>
           </a:p>
@@ -3604,7 +3609,7 @@
           <a:p>
             <a:fld id="{B6CD1D1C-A60F-49DB-B039-0E3E8AB8179F}" type="datetimeFigureOut">
               <a:rPr lang="en-US" smtClean="0"/>
-              <a:t>9/25/2019</a:t>
+              <a:t>10/20/2019</a:t>
             </a:fld>
             <a:endParaRPr lang="en-US"/>
           </a:p>
@@ -3698,7 +3703,7 @@
           <a:lstStyle/>
           <a:p>
             <a:r>
-              <a:rPr lang="en-US" smtClean="0"/>
+              <a:rPr lang="en-US"/>
               <a:t>Click to edit Master title style</a:t>
             </a:r>
             <a:endParaRPr lang="en-US" dirty="0"/>
@@ -3757,35 +3762,35 @@
           <a:p>
             <a:pPr lvl="0"/>
             <a:r>
-              <a:rPr lang="en-US" smtClean="0"/>
+              <a:rPr lang="en-US"/>
               <a:t>Edit Master text styles</a:t>
             </a:r>
           </a:p>
           <a:p>
             <a:pPr lvl="1"/>
             <a:r>
-              <a:rPr lang="en-US" smtClean="0"/>
+              <a:rPr lang="en-US"/>
               <a:t>Second level</a:t>
             </a:r>
           </a:p>
           <a:p>
             <a:pPr lvl="2"/>
             <a:r>
-              <a:rPr lang="en-US" smtClean="0"/>
+              <a:rPr lang="en-US"/>
               <a:t>Third level</a:t>
             </a:r>
           </a:p>
           <a:p>
             <a:pPr lvl="3"/>
             <a:r>
-              <a:rPr lang="en-US" smtClean="0"/>
+              <a:rPr lang="en-US"/>
               <a:t>Fourth level</a:t>
             </a:r>
           </a:p>
           <a:p>
             <a:pPr lvl="4"/>
             <a:r>
-              <a:rPr lang="en-US" smtClean="0"/>
+              <a:rPr lang="en-US"/>
               <a:t>Fifth level</a:t>
             </a:r>
             <a:endParaRPr lang="en-US" dirty="0"/>
@@ -3844,35 +3849,35 @@
           <a:p>
             <a:pPr lvl="0"/>
             <a:r>
-              <a:rPr lang="en-US" smtClean="0"/>
+              <a:rPr lang="en-US"/>
               <a:t>Edit Master text styles</a:t>
             </a:r>
           </a:p>
           <a:p>
             <a:pPr lvl="1"/>
             <a:r>
-              <a:rPr lang="en-US" smtClean="0"/>
+              <a:rPr lang="en-US"/>
               <a:t>Second level</a:t>
             </a:r>
           </a:p>
           <a:p>
             <a:pPr lvl="2"/>
             <a:r>
-              <a:rPr lang="en-US" smtClean="0"/>
+              <a:rPr lang="en-US"/>
               <a:t>Third level</a:t>
             </a:r>
           </a:p>
           <a:p>
             <a:pPr lvl="3"/>
             <a:r>
-              <a:rPr lang="en-US" smtClean="0"/>
+              <a:rPr lang="en-US"/>
               <a:t>Fourth level</a:t>
             </a:r>
           </a:p>
           <a:p>
             <a:pPr lvl="4"/>
             <a:r>
-              <a:rPr lang="en-US" smtClean="0"/>
+              <a:rPr lang="en-US"/>
               <a:t>Fifth level</a:t>
             </a:r>
             <a:endParaRPr lang="en-US" dirty="0"/>
@@ -3896,7 +3901,7 @@
           <a:p>
             <a:fld id="{B6CD1D1C-A60F-49DB-B039-0E3E8AB8179F}" type="datetimeFigureOut">
               <a:rPr lang="en-US" smtClean="0"/>
-              <a:t>9/25/2019</a:t>
+              <a:t>10/20/2019</a:t>
             </a:fld>
             <a:endParaRPr lang="en-US"/>
           </a:p>
@@ -3994,7 +3999,7 @@
           </a:lstStyle>
           <a:p>
             <a:r>
-              <a:rPr lang="en-US" smtClean="0"/>
+              <a:rPr lang="en-US"/>
               <a:t>Click to edit Master title style</a:t>
             </a:r>
             <a:endParaRPr lang="en-US" dirty="0"/>
@@ -4069,7 +4074,7 @@
           <a:p>
             <a:pPr lvl="0"/>
             <a:r>
-              <a:rPr lang="en-US" smtClean="0"/>
+              <a:rPr lang="en-US"/>
               <a:t>Edit Master text styles</a:t>
             </a:r>
           </a:p>
@@ -4127,35 +4132,35 @@
           <a:p>
             <a:pPr lvl="0"/>
             <a:r>
-              <a:rPr lang="en-US" smtClean="0"/>
+              <a:rPr lang="en-US"/>
               <a:t>Edit Master text styles</a:t>
             </a:r>
           </a:p>
           <a:p>
             <a:pPr lvl="1"/>
             <a:r>
-              <a:rPr lang="en-US" smtClean="0"/>
+              <a:rPr lang="en-US"/>
               <a:t>Second level</a:t>
             </a:r>
           </a:p>
           <a:p>
             <a:pPr lvl="2"/>
             <a:r>
-              <a:rPr lang="en-US" smtClean="0"/>
+              <a:rPr lang="en-US"/>
               <a:t>Third level</a:t>
             </a:r>
           </a:p>
           <a:p>
             <a:pPr lvl="3"/>
             <a:r>
-              <a:rPr lang="en-US" smtClean="0"/>
+              <a:rPr lang="en-US"/>
               <a:t>Fourth level</a:t>
             </a:r>
           </a:p>
           <a:p>
             <a:pPr lvl="4"/>
             <a:r>
-              <a:rPr lang="en-US" smtClean="0"/>
+              <a:rPr lang="en-US"/>
               <a:t>Fifth level</a:t>
             </a:r>
             <a:endParaRPr lang="en-US" dirty="0"/>
@@ -4230,7 +4235,7 @@
           <a:p>
             <a:pPr lvl="0"/>
             <a:r>
-              <a:rPr lang="en-US" smtClean="0"/>
+              <a:rPr lang="en-US"/>
               <a:t>Edit Master text styles</a:t>
             </a:r>
           </a:p>
@@ -4288,35 +4293,35 @@
           <a:p>
             <a:pPr lvl="0"/>
             <a:r>
-              <a:rPr lang="en-US" smtClean="0"/>
+              <a:rPr lang="en-US"/>
               <a:t>Edit Master text styles</a:t>
             </a:r>
           </a:p>
           <a:p>
             <a:pPr lvl="1"/>
             <a:r>
-              <a:rPr lang="en-US" smtClean="0"/>
+              <a:rPr lang="en-US"/>
               <a:t>Second level</a:t>
             </a:r>
           </a:p>
           <a:p>
             <a:pPr lvl="2"/>
             <a:r>
-              <a:rPr lang="en-US" smtClean="0"/>
+              <a:rPr lang="en-US"/>
               <a:t>Third level</a:t>
             </a:r>
           </a:p>
           <a:p>
             <a:pPr lvl="3"/>
             <a:r>
-              <a:rPr lang="en-US" smtClean="0"/>
+              <a:rPr lang="en-US"/>
               <a:t>Fourth level</a:t>
             </a:r>
           </a:p>
           <a:p>
             <a:pPr lvl="4"/>
             <a:r>
-              <a:rPr lang="en-US" smtClean="0"/>
+              <a:rPr lang="en-US"/>
               <a:t>Fifth level</a:t>
             </a:r>
             <a:endParaRPr lang="en-US" dirty="0"/>
@@ -4340,7 +4345,7 @@
           <a:p>
             <a:fld id="{B6CD1D1C-A60F-49DB-B039-0E3E8AB8179F}" type="datetimeFigureOut">
               <a:rPr lang="en-US" smtClean="0"/>
-              <a:t>9/25/2019</a:t>
+              <a:t>10/20/2019</a:t>
             </a:fld>
             <a:endParaRPr lang="en-US"/>
           </a:p>
@@ -4434,7 +4439,7 @@
           <a:lstStyle/>
           <a:p>
             <a:r>
-              <a:rPr lang="en-US" smtClean="0"/>
+              <a:rPr lang="en-US"/>
               <a:t>Click to edit Master title style</a:t>
             </a:r>
             <a:endParaRPr lang="en-US" dirty="0"/>
@@ -4458,7 +4463,7 @@
           <a:p>
             <a:fld id="{B6CD1D1C-A60F-49DB-B039-0E3E8AB8179F}" type="datetimeFigureOut">
               <a:rPr lang="en-US" smtClean="0"/>
-              <a:t>9/25/2019</a:t>
+              <a:t>10/20/2019</a:t>
             </a:fld>
             <a:endParaRPr lang="en-US"/>
           </a:p>
@@ -4553,7 +4558,7 @@
           <a:p>
             <a:fld id="{B6CD1D1C-A60F-49DB-B039-0E3E8AB8179F}" type="datetimeFigureOut">
               <a:rPr lang="en-US" smtClean="0"/>
-              <a:t>9/25/2019</a:t>
+              <a:t>10/20/2019</a:t>
             </a:fld>
             <a:endParaRPr lang="en-US"/>
           </a:p>
@@ -4656,7 +4661,7 @@
           </a:lstStyle>
           <a:p>
             <a:r>
-              <a:rPr lang="en-US" smtClean="0"/>
+              <a:rPr lang="en-US"/>
               <a:t>Click to edit Master title style</a:t>
             </a:r>
             <a:endParaRPr lang="en-US" dirty="0"/>
@@ -4715,35 +4720,35 @@
           <a:p>
             <a:pPr lvl="0"/>
             <a:r>
-              <a:rPr lang="en-US" smtClean="0"/>
+              <a:rPr lang="en-US"/>
               <a:t>Edit Master text styles</a:t>
             </a:r>
           </a:p>
           <a:p>
             <a:pPr lvl="1"/>
             <a:r>
-              <a:rPr lang="en-US" smtClean="0"/>
+              <a:rPr lang="en-US"/>
               <a:t>Second level</a:t>
             </a:r>
           </a:p>
           <a:p>
             <a:pPr lvl="2"/>
             <a:r>
-              <a:rPr lang="en-US" smtClean="0"/>
+              <a:rPr lang="en-US"/>
               <a:t>Third level</a:t>
             </a:r>
           </a:p>
           <a:p>
             <a:pPr lvl="3"/>
             <a:r>
-              <a:rPr lang="en-US" smtClean="0"/>
+              <a:rPr lang="en-US"/>
               <a:t>Fourth level</a:t>
             </a:r>
           </a:p>
           <a:p>
             <a:pPr lvl="4"/>
             <a:r>
-              <a:rPr lang="en-US" smtClean="0"/>
+              <a:rPr lang="en-US"/>
               <a:t>Fifth level</a:t>
             </a:r>
             <a:endParaRPr lang="en-US" dirty="0"/>
@@ -4809,7 +4814,7 @@
           <a:p>
             <a:pPr lvl="0"/>
             <a:r>
-              <a:rPr lang="en-US" smtClean="0"/>
+              <a:rPr lang="en-US"/>
               <a:t>Edit Master text styles</a:t>
             </a:r>
           </a:p>
@@ -4832,7 +4837,7 @@
           <a:p>
             <a:fld id="{B6CD1D1C-A60F-49DB-B039-0E3E8AB8179F}" type="datetimeFigureOut">
               <a:rPr lang="en-US" smtClean="0"/>
-              <a:t>9/25/2019</a:t>
+              <a:t>10/20/2019</a:t>
             </a:fld>
             <a:endParaRPr lang="en-US"/>
           </a:p>
@@ -4937,7 +4942,7 @@
           </a:lstStyle>
           <a:p>
             <a:r>
-              <a:rPr lang="en-US" smtClean="0"/>
+              <a:rPr lang="en-US"/>
               <a:t>Click to edit Master title style</a:t>
             </a:r>
             <a:endParaRPr lang="en-US" dirty="0"/>
@@ -5016,7 +5021,7 @@
           </a:lstStyle>
           <a:p>
             <a:r>
-              <a:rPr lang="en-US" smtClean="0"/>
+              <a:rPr lang="en-US"/>
               <a:t>Click icon to add picture</a:t>
             </a:r>
             <a:endParaRPr lang="en-US" dirty="0"/>
@@ -5084,7 +5089,7 @@
           <a:p>
             <a:pPr lvl="0"/>
             <a:r>
-              <a:rPr lang="en-US" smtClean="0"/>
+              <a:rPr lang="en-US"/>
               <a:t>Edit Master text styles</a:t>
             </a:r>
           </a:p>
@@ -5107,7 +5112,7 @@
           <a:p>
             <a:fld id="{B6CD1D1C-A60F-49DB-B039-0E3E8AB8179F}" type="datetimeFigureOut">
               <a:rPr lang="en-US" smtClean="0"/>
-              <a:t>9/25/2019</a:t>
+              <a:t>10/20/2019</a:t>
             </a:fld>
             <a:endParaRPr lang="en-US"/>
           </a:p>
@@ -5425,7 +5430,7 @@
           <a:lstStyle/>
           <a:p>
             <a:r>
-              <a:rPr lang="en-US" smtClean="0"/>
+              <a:rPr lang="en-US"/>
               <a:t>Click to edit Master title style</a:t>
             </a:r>
             <a:endParaRPr lang="en-US" dirty="0"/>
@@ -5459,35 +5464,35 @@
           <a:p>
             <a:pPr lvl="0"/>
             <a:r>
-              <a:rPr lang="en-US" smtClean="0"/>
+              <a:rPr lang="en-US"/>
               <a:t>Edit Master text styles</a:t>
             </a:r>
           </a:p>
           <a:p>
             <a:pPr lvl="1"/>
             <a:r>
-              <a:rPr lang="en-US" smtClean="0"/>
+              <a:rPr lang="en-US"/>
               <a:t>Second level</a:t>
             </a:r>
           </a:p>
           <a:p>
             <a:pPr lvl="2"/>
             <a:r>
-              <a:rPr lang="en-US" smtClean="0"/>
+              <a:rPr lang="en-US"/>
               <a:t>Third level</a:t>
             </a:r>
           </a:p>
           <a:p>
             <a:pPr lvl="3"/>
             <a:r>
-              <a:rPr lang="en-US" smtClean="0"/>
+              <a:rPr lang="en-US"/>
               <a:t>Fourth level</a:t>
             </a:r>
           </a:p>
           <a:p>
             <a:pPr lvl="4"/>
             <a:r>
-              <a:rPr lang="en-US" smtClean="0"/>
+              <a:rPr lang="en-US"/>
               <a:t>Fifth level</a:t>
             </a:r>
             <a:endParaRPr lang="en-US" dirty="0"/>
@@ -5530,7 +5535,7 @@
           <a:p>
             <a:fld id="{B6CD1D1C-A60F-49DB-B039-0E3E8AB8179F}" type="datetimeFigureOut">
               <a:rPr lang="en-US" smtClean="0"/>
-              <a:t>9/25/2019</a:t>
+              <a:t>10/20/2019</a:t>
             </a:fld>
             <a:endParaRPr lang="en-US"/>
           </a:p>
@@ -6074,10 +6079,9 @@
           <a:lstStyle/>
           <a:p>
             <a:r>
-              <a:rPr lang="en-US" dirty="0" smtClean="0"/>
+              <a:rPr lang="en-US" dirty="0"/>
               <a:t>RESTful APIs</a:t>
             </a:r>
-            <a:endParaRPr lang="en-US" dirty="0"/>
           </a:p>
         </p:txBody>
       </p:sp>
@@ -6097,10 +6101,9 @@
           <a:lstStyle/>
           <a:p>
             <a:r>
-              <a:rPr lang="en-US" dirty="0" smtClean="0"/>
+              <a:rPr lang="en-US" dirty="0"/>
               <a:t>Representational State Transfer Application programming interface</a:t>
             </a:r>
-            <a:endParaRPr lang="en-US" dirty="0"/>
           </a:p>
         </p:txBody>
       </p:sp>
@@ -6114,13 +6117,6 @@
   <p:clrMapOvr>
     <a:masterClrMapping/>
   </p:clrMapOvr>
-  <p:timing>
-    <p:tnLst>
-      <p:par>
-        <p:cTn id="1" dur="indefinite" restart="never" nodeType="tmRoot"/>
-      </p:par>
-    </p:tnLst>
-  </p:timing>
 </p:sld>
 </file>
 
@@ -6158,13 +6154,8 @@
           <a:p>
             <a:r>
               <a:rPr lang="en-US" dirty="0"/>
-              <a:t>Code on demand (optional) </a:t>
-            </a:r>
-            <a:r>
-              <a:rPr lang="en-US" dirty="0" smtClean="0"/>
-              <a:t>Principle</a:t>
-            </a:r>
-            <a:endParaRPr lang="en-US" dirty="0"/>
+              <a:t>Code on demand (optional) Principle</a:t>
+            </a:r>
           </a:p>
         </p:txBody>
       </p:sp>
@@ -6204,13 +6195,6 @@
   <p:clrMapOvr>
     <a:masterClrMapping/>
   </p:clrMapOvr>
-  <p:timing>
-    <p:tnLst>
-      <p:par>
-        <p:cTn id="1" dur="indefinite" restart="never" nodeType="tmRoot"/>
-      </p:par>
-    </p:tnLst>
-  </p:timing>
 </p:sld>
 </file>
 
@@ -6247,10 +6231,9 @@
           <a:lstStyle/>
           <a:p>
             <a:r>
-              <a:rPr lang="en-US" dirty="0" smtClean="0"/>
+              <a:rPr lang="en-US" dirty="0"/>
               <a:t>HTTP Verbs for API use</a:t>
             </a:r>
-            <a:endParaRPr lang="en-US" dirty="0"/>
           </a:p>
         </p:txBody>
       </p:sp>
@@ -6270,56 +6253,55 @@
           <a:lstStyle/>
           <a:p>
             <a:r>
-              <a:rPr lang="en-US" dirty="0" smtClean="0"/>
+              <a:rPr lang="en-US" dirty="0"/>
               <a:t>GET:</a:t>
             </a:r>
           </a:p>
           <a:p>
             <a:pPr lvl="1"/>
             <a:r>
-              <a:rPr lang="en-US" dirty="0" smtClean="0"/>
+              <a:rPr lang="en-US" dirty="0"/>
               <a:t>Read a specific resource (by an identifier) or a collection of resources</a:t>
             </a:r>
           </a:p>
           <a:p>
             <a:r>
-              <a:rPr lang="en-US" dirty="0" smtClean="0"/>
+              <a:rPr lang="en-US" dirty="0"/>
               <a:t>PUT:</a:t>
             </a:r>
           </a:p>
           <a:p>
             <a:pPr lvl="1"/>
             <a:r>
-              <a:rPr lang="en-US" dirty="0" smtClean="0"/>
+              <a:rPr lang="en-US" dirty="0"/>
               <a:t>Update a specific resource (by an identifier) or a collection of resources  Can also be used to create a specific resource if the resource identifier is known before hand.</a:t>
             </a:r>
           </a:p>
           <a:p>
             <a:r>
-              <a:rPr lang="en-US" dirty="0" smtClean="0"/>
+              <a:rPr lang="en-US" dirty="0"/>
               <a:t>DELETE:</a:t>
             </a:r>
           </a:p>
           <a:p>
             <a:pPr lvl="1"/>
             <a:r>
-              <a:rPr lang="en-US" dirty="0" smtClean="0"/>
+              <a:rPr lang="en-US" dirty="0"/>
               <a:t>Remove/delete a specific resource by an identifier</a:t>
             </a:r>
           </a:p>
           <a:p>
             <a:r>
-              <a:rPr lang="en-US" dirty="0" smtClean="0"/>
+              <a:rPr lang="en-US" dirty="0"/>
               <a:t>POST:</a:t>
             </a:r>
           </a:p>
           <a:p>
             <a:pPr lvl="1"/>
             <a:r>
-              <a:rPr lang="en-US" dirty="0" smtClean="0"/>
+              <a:rPr lang="en-US" dirty="0"/>
               <a:t>Create a new resource.  Also a catch-all verb for operations that don’t fit into the other categories</a:t>
             </a:r>
-            <a:endParaRPr lang="en-US" dirty="0"/>
           </a:p>
         </p:txBody>
       </p:sp>
@@ -6333,13 +6315,6 @@
   <p:clrMapOvr>
     <a:masterClrMapping/>
   </p:clrMapOvr>
-  <p:timing>
-    <p:tnLst>
-      <p:par>
-        <p:cTn id="1" dur="indefinite" restart="never" nodeType="tmRoot"/>
-      </p:par>
-    </p:tnLst>
-  </p:timing>
 </p:sld>
 </file>
 
@@ -6376,10 +6351,9 @@
           <a:lstStyle/>
           <a:p>
             <a:r>
-              <a:rPr lang="en-US" dirty="0" smtClean="0"/>
+              <a:rPr lang="en-US" dirty="0"/>
               <a:t>SOURCE</a:t>
             </a:r>
-            <a:endParaRPr lang="en-US" dirty="0"/>
           </a:p>
         </p:txBody>
       </p:sp>
@@ -6402,81 +6376,51 @@
               <a:rPr lang="en-US" dirty="0">
                 <a:hlinkClick r:id="rId2"/>
               </a:rPr>
-              <a:t>https://restfulapi.net</a:t>
-            </a:r>
-            <a:r>
-              <a:rPr lang="en-US" dirty="0" smtClean="0">
-                <a:hlinkClick r:id="rId2"/>
-              </a:rPr>
-              <a:t>/</a:t>
-            </a:r>
-            <a:endParaRPr lang="en-US" dirty="0" smtClean="0"/>
+              <a:t>https://restfulapi.net/</a:t>
+            </a:r>
+            <a:endParaRPr lang="en-US" dirty="0"/>
           </a:p>
           <a:p>
             <a:r>
               <a:rPr lang="en-US" dirty="0">
                 <a:hlinkClick r:id="rId3"/>
               </a:rPr>
-              <a:t>https://</a:t>
-            </a:r>
-            <a:r>
-              <a:rPr lang="en-US" dirty="0" smtClean="0">
-                <a:hlinkClick r:id="rId3"/>
-              </a:rPr>
-              <a:t>www.mulesoft.com/resources/api/what-is-rest-api-design</a:t>
-            </a:r>
-            <a:endParaRPr lang="en-US" dirty="0" smtClean="0"/>
+              <a:t>https://www.mulesoft.com/resources/api/what-is-rest-api-design</a:t>
+            </a:r>
+            <a:endParaRPr lang="en-US" dirty="0"/>
           </a:p>
           <a:p>
             <a:r>
               <a:rPr lang="en-US" dirty="0">
                 <a:hlinkClick r:id="rId4"/>
               </a:rPr>
-              <a:t>https://www.restapitutorial.com</a:t>
-            </a:r>
-            <a:r>
-              <a:rPr lang="en-US" dirty="0" smtClean="0">
-                <a:hlinkClick r:id="rId4"/>
-              </a:rPr>
-              <a:t>/</a:t>
-            </a:r>
-            <a:endParaRPr lang="en-US" dirty="0" smtClean="0"/>
+              <a:t>https://www.restapitutorial.com/</a:t>
+            </a:r>
+            <a:endParaRPr lang="en-US" dirty="0"/>
           </a:p>
           <a:p>
             <a:r>
               <a:rPr lang="en-US" dirty="0">
                 <a:hlinkClick r:id="rId5"/>
               </a:rPr>
-              <a:t>https://</a:t>
-            </a:r>
-            <a:r>
-              <a:rPr lang="en-US" dirty="0" smtClean="0">
-                <a:hlinkClick r:id="rId5"/>
-              </a:rPr>
-              <a:t>www.restapitutorial.com/lessons/restquicktips.html</a:t>
-            </a:r>
-            <a:endParaRPr lang="en-US" dirty="0" smtClean="0"/>
+              <a:t>https://www.restapitutorial.com/lessons/restquicktips.html</a:t>
+            </a:r>
+            <a:endParaRPr lang="en-US" dirty="0"/>
           </a:p>
           <a:p>
             <a:r>
               <a:rPr lang="en-US" dirty="0">
                 <a:hlinkClick r:id="rId6"/>
               </a:rPr>
-              <a:t>https://</a:t>
-            </a:r>
-            <a:r>
-              <a:rPr lang="en-US" dirty="0" smtClean="0">
-                <a:hlinkClick r:id="rId6"/>
-              </a:rPr>
-              <a:t>developers.google.com/photos/library/guides/about-restful-apis</a:t>
-            </a:r>
-            <a:r>
-              <a:rPr lang="en-US" dirty="0" smtClean="0"/>
+              <a:t>https://developers.google.com/photos/library/guides/about-restful-apis</a:t>
+            </a:r>
+            <a:r>
+              <a:rPr lang="en-US" dirty="0"/>
               <a:t> </a:t>
             </a:r>
           </a:p>
           <a:p>
-            <a:endParaRPr lang="en-US" dirty="0" smtClean="0"/>
+            <a:endParaRPr lang="en-US" dirty="0"/>
           </a:p>
           <a:p>
             <a:endParaRPr lang="en-US" dirty="0"/>
@@ -6493,13 +6437,6 @@
   <p:clrMapOvr>
     <a:masterClrMapping/>
   </p:clrMapOvr>
-  <p:timing>
-    <p:tnLst>
-      <p:par>
-        <p:cTn id="1" dur="indefinite" restart="never" nodeType="tmRoot"/>
-      </p:par>
-    </p:tnLst>
-  </p:timing>
 </p:sld>
 </file>
 
@@ -6536,104 +6473,103 @@
           <a:lstStyle/>
           <a:p>
             <a:r>
-              <a:rPr lang="en-US" dirty="0" smtClean="0"/>
+              <a:rPr lang="en-US" dirty="0"/>
               <a:t>Outline</a:t>
             </a:r>
+          </a:p>
+        </p:txBody>
+      </p:sp>
+      <p:sp>
+        <p:nvSpPr>
+          <p:cNvPr id="3" name="Content Placeholder 2"/>
+          <p:cNvSpPr>
+            <a:spLocks noGrp="1"/>
+          </p:cNvSpPr>
+          <p:nvPr>
+            <p:ph idx="1"/>
+          </p:nvPr>
+        </p:nvSpPr>
+        <p:spPr/>
+        <p:txBody>
+          <a:bodyPr/>
+          <a:lstStyle/>
+          <a:p>
+            <a:r>
+              <a:rPr lang="en-US" dirty="0"/>
+              <a:t>What is REST</a:t>
+            </a:r>
+          </a:p>
+          <a:p>
+            <a:r>
+              <a:rPr lang="en-US" dirty="0"/>
+              <a:t>Principles of REST</a:t>
+            </a:r>
+          </a:p>
+          <a:p>
+            <a:pPr lvl="1"/>
+            <a:r>
+              <a:rPr lang="en-US" dirty="0"/>
+              <a:t>Client-Server</a:t>
+            </a:r>
+          </a:p>
+          <a:p>
+            <a:pPr lvl="1"/>
+            <a:r>
+              <a:rPr lang="en-US" dirty="0"/>
+              <a:t>Stateless</a:t>
+            </a:r>
+          </a:p>
+          <a:p>
+            <a:pPr lvl="1"/>
+            <a:r>
+              <a:rPr lang="en-US" dirty="0"/>
+              <a:t>Cacheable</a:t>
+            </a:r>
+          </a:p>
+          <a:p>
+            <a:pPr lvl="1"/>
+            <a:r>
+              <a:rPr lang="en-US" dirty="0"/>
+              <a:t>Uniform Interface</a:t>
+            </a:r>
+          </a:p>
+          <a:p>
+            <a:pPr lvl="1"/>
+            <a:r>
+              <a:rPr lang="en-US" dirty="0"/>
+              <a:t>Layered System</a:t>
+            </a:r>
+          </a:p>
+          <a:p>
+            <a:pPr lvl="1"/>
+            <a:r>
+              <a:rPr lang="en-US" dirty="0"/>
+              <a:t>Code on Demand</a:t>
+            </a:r>
+          </a:p>
+          <a:p>
+            <a:r>
+              <a:rPr lang="en-US" dirty="0"/>
+              <a:t>HTTP Verbs for API use</a:t>
+            </a:r>
+          </a:p>
+          <a:p>
+            <a:r>
+              <a:rPr lang="en-US" dirty="0"/>
+              <a:t>Sources</a:t>
+            </a:r>
+          </a:p>
+          <a:p>
+            <a:pPr lvl="1"/>
             <a:endParaRPr lang="en-US" dirty="0"/>
           </a:p>
-        </p:txBody>
-      </p:sp>
-      <p:sp>
-        <p:nvSpPr>
-          <p:cNvPr id="3" name="Content Placeholder 2"/>
-          <p:cNvSpPr>
-            <a:spLocks noGrp="1"/>
-          </p:cNvSpPr>
-          <p:nvPr>
-            <p:ph idx="1"/>
-          </p:nvPr>
-        </p:nvSpPr>
-        <p:spPr/>
-        <p:txBody>
-          <a:bodyPr/>
-          <a:lstStyle/>
-          <a:p>
-            <a:r>
-              <a:rPr lang="en-US" dirty="0" smtClean="0"/>
-              <a:t>What is REST</a:t>
-            </a:r>
-          </a:p>
-          <a:p>
-            <a:r>
-              <a:rPr lang="en-US" dirty="0" smtClean="0"/>
-              <a:t>Principles of REST</a:t>
-            </a:r>
-          </a:p>
           <a:p>
             <a:pPr lvl="1"/>
-            <a:r>
-              <a:rPr lang="en-US" dirty="0" smtClean="0"/>
-              <a:t>Client-Server</a:t>
-            </a:r>
+            <a:endParaRPr lang="en-US" dirty="0"/>
           </a:p>
           <a:p>
             <a:pPr lvl="1"/>
-            <a:r>
-              <a:rPr lang="en-US" dirty="0" smtClean="0"/>
-              <a:t>Stateless</a:t>
-            </a:r>
-          </a:p>
-          <a:p>
-            <a:pPr lvl="1"/>
-            <a:r>
-              <a:rPr lang="en-US" dirty="0" smtClean="0"/>
-              <a:t>Cacheable</a:t>
-            </a:r>
-          </a:p>
-          <a:p>
-            <a:pPr lvl="1"/>
-            <a:r>
-              <a:rPr lang="en-US" dirty="0" smtClean="0"/>
-              <a:t>Uniform Interface</a:t>
-            </a:r>
-          </a:p>
-          <a:p>
-            <a:pPr lvl="1"/>
-            <a:r>
-              <a:rPr lang="en-US" dirty="0" smtClean="0"/>
-              <a:t>Layered System</a:t>
-            </a:r>
-          </a:p>
-          <a:p>
-            <a:pPr lvl="1"/>
-            <a:r>
-              <a:rPr lang="en-US" dirty="0" smtClean="0"/>
-              <a:t>Code on Demand</a:t>
-            </a:r>
-          </a:p>
-          <a:p>
-            <a:r>
-              <a:rPr lang="en-US" dirty="0" smtClean="0"/>
-              <a:t>HTTP Verbs for API use</a:t>
-            </a:r>
-          </a:p>
-          <a:p>
-            <a:r>
-              <a:rPr lang="en-US" dirty="0" smtClean="0"/>
-              <a:t>Sources</a:t>
-            </a:r>
-          </a:p>
-          <a:p>
-            <a:pPr lvl="1"/>
-            <a:endParaRPr lang="en-US" dirty="0" smtClean="0"/>
-          </a:p>
-          <a:p>
-            <a:pPr lvl="1"/>
-            <a:endParaRPr lang="en-US" dirty="0" smtClean="0"/>
-          </a:p>
-          <a:p>
-            <a:pPr lvl="1"/>
-            <a:endParaRPr lang="en-US" dirty="0" smtClean="0"/>
+            <a:endParaRPr lang="en-US" dirty="0"/>
           </a:p>
           <a:p>
             <a:endParaRPr lang="en-US" dirty="0"/>
@@ -6650,13 +6586,6 @@
   <p:clrMapOvr>
     <a:masterClrMapping/>
   </p:clrMapOvr>
-  <p:timing>
-    <p:tnLst>
-      <p:par>
-        <p:cTn id="1" dur="indefinite" restart="never" nodeType="tmRoot"/>
-      </p:par>
-    </p:tnLst>
-  </p:timing>
 </p:sld>
 </file>
 
@@ -6693,10 +6622,9 @@
           <a:lstStyle/>
           <a:p>
             <a:r>
-              <a:rPr lang="en-US" dirty="0" smtClean="0"/>
+              <a:rPr lang="en-US" dirty="0"/>
               <a:t>What is REST</a:t>
             </a:r>
-            <a:endParaRPr lang="en-US" dirty="0"/>
           </a:p>
         </p:txBody>
       </p:sp>
@@ -6717,31 +6645,14 @@
           <a:p>
             <a:r>
               <a:rPr lang="en-US" dirty="0"/>
-              <a:t>REST is acronym for </a:t>
-            </a:r>
-            <a:r>
-              <a:rPr lang="en-US" dirty="0" smtClean="0"/>
-              <a:t>Representational </a:t>
-            </a:r>
+              <a:t>REST is acronym for Representational State Transfer. It is architectural style for distributed hypermedia systems and was first presented by Roy Fielding in 2000</a:t>
+            </a:r>
+          </a:p>
+          <a:p>
             <a:r>
               <a:rPr lang="en-US" dirty="0"/>
-              <a:t>State Transfer. It is architectural style for distributed hypermedia systems and was first presented by Roy Fielding in </a:t>
-            </a:r>
-            <a:r>
-              <a:rPr lang="en-US" dirty="0" smtClean="0"/>
-              <a:t>2000</a:t>
-            </a:r>
-          </a:p>
-          <a:p>
-            <a:r>
-              <a:rPr lang="en-US" dirty="0" smtClean="0"/>
-              <a:t>In </a:t>
-            </a:r>
-            <a:r>
-              <a:rPr lang="en-US" dirty="0"/>
-              <a:t>a RESTful system, resources are stored in a data store; a client sends a request that the server perform a particular action (such as creating, retrieving, updating, or deleting a resource), and the server performs the action and sends a response, often in the form of a representation of the specified resource.</a:t>
-            </a:r>
-            <a:endParaRPr lang="en-US" dirty="0" smtClean="0"/>
+              <a:t>In a RESTful system, resources are stored in a data store; a client sends a request that the server perform a particular action (such as creating, retrieving, updating, or deleting a resource), and the server performs the action and sends a response, often in the form of a representation of the specified resource.</a:t>
+            </a:r>
           </a:p>
           <a:p>
             <a:endParaRPr lang="en-US" dirty="0"/>
@@ -6758,13 +6669,6 @@
   <p:clrMapOvr>
     <a:masterClrMapping/>
   </p:clrMapOvr>
-  <p:timing>
-    <p:tnLst>
-      <p:par>
-        <p:cTn id="1" dur="indefinite" restart="never" nodeType="tmRoot"/>
-      </p:par>
-    </p:tnLst>
-  </p:timing>
 </p:sld>
 </file>
 
@@ -6801,10 +6705,9 @@
           <a:lstStyle/>
           <a:p>
             <a:r>
-              <a:rPr lang="en-US" dirty="0" smtClean="0"/>
+              <a:rPr lang="en-US" dirty="0"/>
               <a:t>Principles of REST</a:t>
             </a:r>
-            <a:endParaRPr lang="en-US" dirty="0"/>
           </a:p>
         </p:txBody>
       </p:sp>
@@ -6824,40 +6727,39 @@
           <a:lstStyle/>
           <a:p>
             <a:r>
-              <a:rPr lang="en-US" dirty="0" smtClean="0"/>
+              <a:rPr lang="en-US" dirty="0"/>
               <a:t>Client-Server</a:t>
             </a:r>
           </a:p>
           <a:p>
             <a:r>
-              <a:rPr lang="en-US" dirty="0" smtClean="0"/>
+              <a:rPr lang="en-US" dirty="0"/>
               <a:t>Stateless</a:t>
             </a:r>
           </a:p>
           <a:p>
             <a:r>
-              <a:rPr lang="en-US" dirty="0" smtClean="0"/>
+              <a:rPr lang="en-US" dirty="0"/>
               <a:t>Cacheable</a:t>
             </a:r>
           </a:p>
           <a:p>
             <a:r>
-              <a:rPr lang="en-US" dirty="0" smtClean="0"/>
+              <a:rPr lang="en-US" dirty="0"/>
               <a:t>Uniform interface</a:t>
             </a:r>
           </a:p>
           <a:p>
             <a:r>
-              <a:rPr lang="en-US" dirty="0" smtClean="0"/>
+              <a:rPr lang="en-US" dirty="0"/>
               <a:t>Layered system</a:t>
             </a:r>
           </a:p>
           <a:p>
             <a:r>
-              <a:rPr lang="en-US" dirty="0" smtClean="0"/>
+              <a:rPr lang="en-US" dirty="0"/>
               <a:t>Code on demand (optional)</a:t>
             </a:r>
-            <a:endParaRPr lang="en-US" dirty="0"/>
           </a:p>
         </p:txBody>
       </p:sp>
@@ -6871,13 +6773,6 @@
   <p:clrMapOvr>
     <a:masterClrMapping/>
   </p:clrMapOvr>
-  <p:timing>
-    <p:tnLst>
-      <p:par>
-        <p:cTn id="1" dur="indefinite" restart="never" nodeType="tmRoot"/>
-      </p:par>
-    </p:tnLst>
-  </p:timing>
 </p:sld>
 </file>
 
@@ -6919,10 +6814,9 @@
           <a:lstStyle/>
           <a:p>
             <a:r>
-              <a:rPr lang="en-US" dirty="0" smtClean="0"/>
+              <a:rPr lang="en-US" dirty="0"/>
               <a:t>Client-Server Principle</a:t>
             </a:r>
-            <a:endParaRPr lang="en-US" dirty="0"/>
           </a:p>
         </p:txBody>
       </p:sp>
@@ -6949,11 +6843,7 @@
             </a:r>
             <a:r>
               <a:rPr lang="en-US" dirty="0"/>
-              <a:t> – The client-server constraint works on the concept that the client and the server should be separate from each other and allowed to evolve individually and independently. In other words, I should be able to make changes to my mobile application without impacting either the data structure or the database design on the server. At the same time, I should be able to modify the database or make changes to my server application without impacting the mobile client. This creates a separation of concerns, letting each application grow and scale independently of the other and allowing your organization to grow quickly and efficiently</a:t>
-            </a:r>
-            <a:r>
-              <a:rPr lang="en-US" dirty="0" smtClean="0"/>
-              <a:t>.</a:t>
+              <a:t> – The client-server constraint works on the concept that the client and the server should be separate from each other and allowed to evolve individually and independently. In other words, I should be able to make changes to my mobile application without impacting either the data structure or the database design on the server. At the same time, I should be able to modify the database or make changes to my server application without impacting the mobile client. This creates a separation of concerns, letting each application grow and scale independently of the other and allowing your organization to grow quickly and efficiently.</a:t>
             </a:r>
           </a:p>
         </p:txBody>
@@ -6968,13 +6858,6 @@
   <p:clrMapOvr>
     <a:masterClrMapping/>
   </p:clrMapOvr>
-  <p:timing>
-    <p:tnLst>
-      <p:par>
-        <p:cTn id="1" dur="indefinite" restart="never" nodeType="tmRoot"/>
-      </p:par>
-    </p:tnLst>
-  </p:timing>
 </p:sld>
 </file>
 
@@ -7011,10 +6894,9 @@
           <a:lstStyle/>
           <a:p>
             <a:r>
-              <a:rPr lang="en-US" dirty="0" smtClean="0"/>
+              <a:rPr lang="en-US" dirty="0"/>
               <a:t>Stateless Principle</a:t>
             </a:r>
-            <a:endParaRPr lang="en-US" dirty="0"/>
           </a:p>
         </p:txBody>
       </p:sp>
@@ -7041,15 +6923,7 @@
             </a:r>
             <a:r>
               <a:rPr lang="en-US" dirty="0"/>
-              <a:t> </a:t>
-            </a:r>
-            <a:r>
-              <a:rPr lang="en-US" dirty="0" smtClean="0"/>
-              <a:t>– REST </a:t>
-            </a:r>
-            <a:r>
-              <a:rPr lang="en-US" dirty="0"/>
-              <a:t>APIs are stateless, meaning that calls can be made independently of one another, and each call contains all of the data necessary to complete itself successfully. A REST API should not rely on data being stored on the server or sessions to determine what to do with a call, but rather solely rely on the data that is provided in that call itself. Identifying information is not being stored on the server when making calls. Instead, each call has the necessary data in itself, such as the API key, access token, user ID, etc. This also helps increase the API’s reliability by having all of the data necessary to make the call, instead of relying on a series of calls with server state to create an object, which may result in partial fails. Instead, in order to reduce memory requirements and keep your application as scalable as possible, a RESTful API requires that any state is stored on the client—not on the server.</a:t>
+              <a:t> – REST APIs are stateless, meaning that calls can be made independently of one another, and each call contains all of the data necessary to complete itself successfully. A REST API should not rely on data being stored on the server or sessions to determine what to do with a call, but rather solely rely on the data that is provided in that call itself. Identifying information is not being stored on the server when making calls. Instead, each call has the necessary data in itself, such as the API key, access token, user ID, etc. This also helps increase the API’s reliability by having all of the data necessary to make the call, instead of relying on a series of calls with server state to create an object, which may result in partial fails. Instead, in order to reduce memory requirements and keep your application as scalable as possible, a RESTful API requires that any state is stored on the client—not on the server.</a:t>
             </a:r>
           </a:p>
           <a:p>
@@ -7067,13 +6941,6 @@
   <p:clrMapOvr>
     <a:masterClrMapping/>
   </p:clrMapOvr>
-  <p:timing>
-    <p:tnLst>
-      <p:par>
-        <p:cTn id="1" dur="indefinite" restart="never" nodeType="tmRoot"/>
-      </p:par>
-    </p:tnLst>
-  </p:timing>
 </p:sld>
 </file>
 
@@ -7110,10 +6977,9 @@
           <a:lstStyle/>
           <a:p>
             <a:r>
-              <a:rPr lang="en-US" dirty="0" smtClean="0"/>
+              <a:rPr lang="en-US" dirty="0"/>
               <a:t>Cacheable Principle</a:t>
             </a:r>
-            <a:endParaRPr lang="en-US" dirty="0"/>
           </a:p>
         </p:txBody>
       </p:sp>
@@ -7158,13 +7024,6 @@
   <p:clrMapOvr>
     <a:masterClrMapping/>
   </p:clrMapOvr>
-  <p:timing>
-    <p:tnLst>
-      <p:par>
-        <p:cTn id="1" dur="indefinite" restart="never" nodeType="tmRoot"/>
-      </p:par>
-    </p:tnLst>
-  </p:timing>
 </p:sld>
 </file>
 
@@ -7201,10 +7060,9 @@
           <a:lstStyle/>
           <a:p>
             <a:r>
-              <a:rPr lang="en-US" dirty="0" smtClean="0"/>
+              <a:rPr lang="en-US" dirty="0"/>
               <a:t>Uniform Interface Principle</a:t>
             </a:r>
-            <a:endParaRPr lang="en-US" dirty="0"/>
           </a:p>
         </p:txBody>
       </p:sp>
@@ -7254,13 +7112,6 @@
   <p:clrMapOvr>
     <a:masterClrMapping/>
   </p:clrMapOvr>
-  <p:timing>
-    <p:tnLst>
-      <p:par>
-        <p:cTn id="1" dur="indefinite" restart="never" nodeType="tmRoot"/>
-      </p:par>
-    </p:tnLst>
-  </p:timing>
 </p:sld>
 </file>
 
@@ -7297,10 +7148,9 @@
           <a:lstStyle/>
           <a:p>
             <a:r>
-              <a:rPr lang="en-US" dirty="0" smtClean="0"/>
+              <a:rPr lang="en-US" dirty="0"/>
               <a:t>Layered System Principle</a:t>
             </a:r>
-            <a:endParaRPr lang="en-US" dirty="0"/>
           </a:p>
         </p:txBody>
       </p:sp>
@@ -7340,13 +7190,6 @@
   <p:clrMapOvr>
     <a:masterClrMapping/>
   </p:clrMapOvr>
-  <p:timing>
-    <p:tnLst>
-      <p:par>
-        <p:cTn id="1" dur="indefinite" restart="never" nodeType="tmRoot"/>
-      </p:par>
-    </p:tnLst>
-  </p:timing>
 </p:sld>
 </file>
 

</xml_diff>